<commit_message>
change tidy data to data tidying
</commit_message>
<xml_diff>
--- a/powerpoints/tidyr.pptx
+++ b/powerpoints/tidyr.pptx
@@ -2292,7 +2292,7 @@
           </a:ln>
           <a:extLst>
             <a:ext uri="{C572A759-6A51-4108-AA02-DFA0A04FC94B}">
-              <ma14:wrappingTextBoxFlag xmlns="" xmlns:m="http://schemas.openxmlformats.org/officeDocument/2006/math" xmlns:a14="http://schemas.microsoft.com/office/drawing/2010/main" xmlns:ma14="http://schemas.microsoft.com/office/mac/drawingml/2011/main" val="1"/>
+              <ma14:wrappingTextBoxFlag xmlns:ma14="http://schemas.microsoft.com/office/mac/drawingml/2011/main" xmlns:a14="http://schemas.microsoft.com/office/drawing/2010/main" xmlns:m="http://schemas.openxmlformats.org/officeDocument/2006/math" xmlns="" val="1"/>
             </a:ext>
           </a:extLst>
         </p:spPr>
@@ -2331,7 +2331,7 @@
           </a:ln>
           <a:extLst>
             <a:ext uri="{C572A759-6A51-4108-AA02-DFA0A04FC94B}">
-              <ma14:wrappingTextBoxFlag xmlns="" xmlns:m="http://schemas.openxmlformats.org/officeDocument/2006/math" xmlns:a14="http://schemas.microsoft.com/office/drawing/2010/main" xmlns:ma14="http://schemas.microsoft.com/office/mac/drawingml/2011/main" val="1"/>
+              <ma14:wrappingTextBoxFlag xmlns:ma14="http://schemas.microsoft.com/office/mac/drawingml/2011/main" xmlns:a14="http://schemas.microsoft.com/office/drawing/2010/main" xmlns:m="http://schemas.openxmlformats.org/officeDocument/2006/math" xmlns="" val="1"/>
             </a:ext>
           </a:extLst>
         </p:spPr>
@@ -4737,7 +4737,7 @@
           </a:ln>
           <a:extLst>
             <a:ext uri="{C572A759-6A51-4108-AA02-DFA0A04FC94B}">
-              <ma14:wrappingTextBoxFlag xmlns="" xmlns:m="http://schemas.openxmlformats.org/officeDocument/2006/math" xmlns:a14="http://schemas.microsoft.com/office/drawing/2010/main" xmlns:ma14="http://schemas.microsoft.com/office/mac/drawingml/2011/main" val="1"/>
+              <ma14:wrappingTextBoxFlag xmlns:ma14="http://schemas.microsoft.com/office/mac/drawingml/2011/main" xmlns:a14="http://schemas.microsoft.com/office/drawing/2010/main" xmlns:m="http://schemas.openxmlformats.org/officeDocument/2006/math" xmlns="" val="1"/>
             </a:ext>
           </a:extLst>
         </p:spPr>
@@ -4870,16 +4870,12 @@
           <a:lstStyle/>
           <a:p>
             <a:r>
-              <a:rPr dirty="0"/>
-              <a:t>Tidy </a:t>
-            </a:r>
-            <a:r>
               <a:rPr lang="en-US" dirty="0"/>
-              <a:t>d</a:t>
+              <a:t>Data tidying </a:t>
             </a:r>
             <a:r>
               <a:rPr dirty="0"/>
-              <a:t>ata with </a:t>
+              <a:t>with </a:t>
             </a:r>
             <a:r>
               <a:rPr dirty="0" err="1"/>
@@ -4924,7 +4920,7 @@
           </a:ln>
           <a:extLst>
             <a:ext uri="{C572A759-6A51-4108-AA02-DFA0A04FC94B}">
-              <ma14:wrappingTextBoxFlag xmlns="" xmlns:m="http://schemas.openxmlformats.org/officeDocument/2006/math" xmlns:a14="http://schemas.microsoft.com/office/drawing/2010/main" xmlns:ma14="http://schemas.microsoft.com/office/mac/drawingml/2011/main" val="1"/>
+              <ma14:wrappingTextBoxFlag xmlns:ma14="http://schemas.microsoft.com/office/mac/drawingml/2011/main" xmlns:a14="http://schemas.microsoft.com/office/drawing/2010/main" xmlns:m="http://schemas.openxmlformats.org/officeDocument/2006/math" xmlns="" val="1"/>
             </a:ext>
           </a:extLst>
         </p:spPr>
@@ -4974,7 +4970,7 @@
           </a:ln>
           <a:extLst>
             <a:ext uri="{C572A759-6A51-4108-AA02-DFA0A04FC94B}">
-              <ma14:wrappingTextBoxFlag xmlns="" xmlns:m="http://schemas.openxmlformats.org/officeDocument/2006/math" xmlns:a14="http://schemas.microsoft.com/office/drawing/2010/main" xmlns:ma14="http://schemas.microsoft.com/office/mac/drawingml/2011/main" val="1"/>
+              <ma14:wrappingTextBoxFlag xmlns:ma14="http://schemas.microsoft.com/office/mac/drawingml/2011/main" xmlns:a14="http://schemas.microsoft.com/office/drawing/2010/main" xmlns:m="http://schemas.openxmlformats.org/officeDocument/2006/math" xmlns="" val="1"/>
             </a:ext>
           </a:extLst>
         </p:spPr>
@@ -5063,7 +5059,7 @@
           </a:ln>
           <a:extLst>
             <a:ext uri="{C572A759-6A51-4108-AA02-DFA0A04FC94B}">
-              <ma14:wrappingTextBoxFlag xmlns="" xmlns:m="http://schemas.openxmlformats.org/officeDocument/2006/math" xmlns:a14="http://schemas.microsoft.com/office/drawing/2010/main" xmlns:ma14="http://schemas.microsoft.com/office/mac/drawingml/2011/main" val="1"/>
+              <ma14:wrappingTextBoxFlag xmlns:ma14="http://schemas.microsoft.com/office/mac/drawingml/2011/main" xmlns:a14="http://schemas.microsoft.com/office/drawing/2010/main" xmlns:m="http://schemas.openxmlformats.org/officeDocument/2006/math" xmlns="" val="1"/>
             </a:ext>
           </a:extLst>
         </p:spPr>
@@ -5129,7 +5125,7 @@
           </a:ln>
           <a:extLst>
             <a:ext uri="{C572A759-6A51-4108-AA02-DFA0A04FC94B}">
-              <ma14:wrappingTextBoxFlag xmlns="" xmlns:m="http://schemas.openxmlformats.org/officeDocument/2006/math" xmlns:a14="http://schemas.microsoft.com/office/drawing/2010/main" xmlns:ma14="http://schemas.microsoft.com/office/mac/drawingml/2011/main" val="1"/>
+              <ma14:wrappingTextBoxFlag xmlns:ma14="http://schemas.microsoft.com/office/mac/drawingml/2011/main" xmlns:a14="http://schemas.microsoft.com/office/drawing/2010/main" xmlns:m="http://schemas.openxmlformats.org/officeDocument/2006/math" xmlns="" val="1"/>
             </a:ext>
           </a:extLst>
         </p:spPr>
@@ -5204,7 +5200,7 @@
           </a:ln>
           <a:extLst>
             <a:ext uri="{C572A759-6A51-4108-AA02-DFA0A04FC94B}">
-              <ma14:wrappingTextBoxFlag xmlns="" xmlns:m="http://schemas.openxmlformats.org/officeDocument/2006/math" xmlns:a14="http://schemas.microsoft.com/office/drawing/2010/main" xmlns:ma14="http://schemas.microsoft.com/office/mac/drawingml/2011/main" val="1"/>
+              <ma14:wrappingTextBoxFlag xmlns:ma14="http://schemas.microsoft.com/office/mac/drawingml/2011/main" xmlns:a14="http://schemas.microsoft.com/office/drawing/2010/main" xmlns:m="http://schemas.openxmlformats.org/officeDocument/2006/math" xmlns="" val="1"/>
             </a:ext>
           </a:extLst>
         </p:spPr>
@@ -5270,7 +5266,7 @@
           </a:ln>
           <a:extLst>
             <a:ext uri="{C572A759-6A51-4108-AA02-DFA0A04FC94B}">
-              <ma14:wrappingTextBoxFlag xmlns="" xmlns:m="http://schemas.openxmlformats.org/officeDocument/2006/math" xmlns:a14="http://schemas.microsoft.com/office/drawing/2010/main" xmlns:ma14="http://schemas.microsoft.com/office/mac/drawingml/2011/main" val="1"/>
+              <ma14:wrappingTextBoxFlag xmlns:ma14="http://schemas.microsoft.com/office/mac/drawingml/2011/main" xmlns:a14="http://schemas.microsoft.com/office/drawing/2010/main" xmlns:m="http://schemas.openxmlformats.org/officeDocument/2006/math" xmlns="" val="1"/>
             </a:ext>
           </a:extLst>
         </p:spPr>
@@ -5350,7 +5346,7 @@
             <a:effectLst/>
             <a:extLst>
               <a:ext uri="{C572A759-6A51-4108-AA02-DFA0A04FC94B}">
-                <ma14:wrappingTextBoxFlag xmlns="" xmlns:m="http://schemas.openxmlformats.org/officeDocument/2006/math" xmlns:a14="http://schemas.microsoft.com/office/drawing/2010/main" xmlns:ma14="http://schemas.microsoft.com/office/mac/drawingml/2011/main" val="1"/>
+                <ma14:wrappingTextBoxFlag xmlns:ma14="http://schemas.microsoft.com/office/mac/drawingml/2011/main" xmlns:a14="http://schemas.microsoft.com/office/drawing/2010/main" xmlns:m="http://schemas.openxmlformats.org/officeDocument/2006/math" xmlns="" val="1"/>
               </a:ext>
             </a:extLst>
           </p:spPr>
@@ -5697,7 +5693,7 @@
           </a:ln>
           <a:extLst>
             <a:ext uri="{C572A759-6A51-4108-AA02-DFA0A04FC94B}">
-              <ma14:wrappingTextBoxFlag xmlns="" xmlns:m="http://schemas.openxmlformats.org/officeDocument/2006/math" xmlns:a14="http://schemas.microsoft.com/office/drawing/2010/main" xmlns:ma14="http://schemas.microsoft.com/office/mac/drawingml/2011/main" val="1"/>
+              <ma14:wrappingTextBoxFlag xmlns:ma14="http://schemas.microsoft.com/office/mac/drawingml/2011/main" xmlns:a14="http://schemas.microsoft.com/office/drawing/2010/main" xmlns:m="http://schemas.openxmlformats.org/officeDocument/2006/math" xmlns="" val="1"/>
             </a:ext>
           </a:extLst>
         </p:spPr>
@@ -5749,7 +5745,7 @@
           </a:ln>
           <a:extLst>
             <a:ext uri="{C572A759-6A51-4108-AA02-DFA0A04FC94B}">
-              <ma14:wrappingTextBoxFlag xmlns="" xmlns:m="http://schemas.openxmlformats.org/officeDocument/2006/math" xmlns:a14="http://schemas.microsoft.com/office/drawing/2010/main" xmlns:ma14="http://schemas.microsoft.com/office/mac/drawingml/2011/main" val="1"/>
+              <ma14:wrappingTextBoxFlag xmlns:ma14="http://schemas.microsoft.com/office/mac/drawingml/2011/main" xmlns:a14="http://schemas.microsoft.com/office/drawing/2010/main" xmlns:m="http://schemas.openxmlformats.org/officeDocument/2006/math" xmlns="" val="1"/>
             </a:ext>
           </a:extLst>
         </p:spPr>
@@ -5929,7 +5925,7 @@
           </a:ln>
           <a:extLst>
             <a:ext uri="{C572A759-6A51-4108-AA02-DFA0A04FC94B}">
-              <ma14:wrappingTextBoxFlag xmlns="" xmlns:m="http://schemas.openxmlformats.org/officeDocument/2006/math" xmlns:a14="http://schemas.microsoft.com/office/drawing/2010/main" xmlns:ma14="http://schemas.microsoft.com/office/mac/drawingml/2011/main" val="1"/>
+              <ma14:wrappingTextBoxFlag xmlns:ma14="http://schemas.microsoft.com/office/mac/drawingml/2011/main" xmlns:a14="http://schemas.microsoft.com/office/drawing/2010/main" xmlns:m="http://schemas.openxmlformats.org/officeDocument/2006/math" xmlns="" val="1"/>
             </a:ext>
           </a:extLst>
         </p:spPr>
@@ -6158,7 +6154,7 @@
           </a:ln>
           <a:extLst>
             <a:ext uri="{C572A759-6A51-4108-AA02-DFA0A04FC94B}">
-              <ma14:wrappingTextBoxFlag xmlns="" xmlns:m="http://schemas.openxmlformats.org/officeDocument/2006/math" xmlns:a14="http://schemas.microsoft.com/office/drawing/2010/main" xmlns:ma14="http://schemas.microsoft.com/office/mac/drawingml/2011/main" val="1"/>
+              <ma14:wrappingTextBoxFlag xmlns:ma14="http://schemas.microsoft.com/office/mac/drawingml/2011/main" xmlns:a14="http://schemas.microsoft.com/office/drawing/2010/main" xmlns:m="http://schemas.openxmlformats.org/officeDocument/2006/math" xmlns="" val="1"/>
             </a:ext>
           </a:extLst>
         </p:spPr>
@@ -6205,7 +6201,7 @@
           </a:ln>
           <a:extLst>
             <a:ext uri="{C572A759-6A51-4108-AA02-DFA0A04FC94B}">
-              <ma14:wrappingTextBoxFlag xmlns="" xmlns:m="http://schemas.openxmlformats.org/officeDocument/2006/math" xmlns:a14="http://schemas.microsoft.com/office/drawing/2010/main" xmlns:ma14="http://schemas.microsoft.com/office/mac/drawingml/2011/main" val="1"/>
+              <ma14:wrappingTextBoxFlag xmlns:ma14="http://schemas.microsoft.com/office/mac/drawingml/2011/main" xmlns:a14="http://schemas.microsoft.com/office/drawing/2010/main" xmlns:m="http://schemas.openxmlformats.org/officeDocument/2006/math" xmlns="" val="1"/>
             </a:ext>
           </a:extLst>
         </p:spPr>
@@ -6289,7 +6285,7 @@
           </a:ln>
           <a:extLst>
             <a:ext uri="{C572A759-6A51-4108-AA02-DFA0A04FC94B}">
-              <ma14:wrappingTextBoxFlag xmlns="" xmlns:m="http://schemas.openxmlformats.org/officeDocument/2006/math" xmlns:a14="http://schemas.microsoft.com/office/drawing/2010/main" xmlns:ma14="http://schemas.microsoft.com/office/mac/drawingml/2011/main" val="1"/>
+              <ma14:wrappingTextBoxFlag xmlns:ma14="http://schemas.microsoft.com/office/mac/drawingml/2011/main" xmlns:a14="http://schemas.microsoft.com/office/drawing/2010/main" xmlns:m="http://schemas.openxmlformats.org/officeDocument/2006/math" xmlns="" val="1"/>
             </a:ext>
           </a:extLst>
         </p:spPr>
@@ -6456,7 +6452,7 @@
           </a:ln>
           <a:extLst>
             <a:ext uri="{C572A759-6A51-4108-AA02-DFA0A04FC94B}">
-              <ma14:wrappingTextBoxFlag xmlns="" xmlns:m="http://schemas.openxmlformats.org/officeDocument/2006/math" xmlns:a14="http://schemas.microsoft.com/office/drawing/2010/main" xmlns:ma14="http://schemas.microsoft.com/office/mac/drawingml/2011/main" val="1"/>
+              <ma14:wrappingTextBoxFlag xmlns:ma14="http://schemas.microsoft.com/office/mac/drawingml/2011/main" xmlns:a14="http://schemas.microsoft.com/office/drawing/2010/main" xmlns:m="http://schemas.openxmlformats.org/officeDocument/2006/math" xmlns="" val="1"/>
             </a:ext>
           </a:extLst>
         </p:spPr>
@@ -6492,7 +6488,7 @@
           </a:ln>
           <a:extLst>
             <a:ext uri="{C572A759-6A51-4108-AA02-DFA0A04FC94B}">
-              <ma14:wrappingTextBoxFlag xmlns="" xmlns:m="http://schemas.openxmlformats.org/officeDocument/2006/math" xmlns:a14="http://schemas.microsoft.com/office/drawing/2010/main" xmlns:ma14="http://schemas.microsoft.com/office/mac/drawingml/2011/main" val="1"/>
+              <ma14:wrappingTextBoxFlag xmlns:ma14="http://schemas.microsoft.com/office/mac/drawingml/2011/main" xmlns:a14="http://schemas.microsoft.com/office/drawing/2010/main" xmlns:m="http://schemas.openxmlformats.org/officeDocument/2006/math" xmlns="" val="1"/>
             </a:ext>
           </a:extLst>
         </p:spPr>
@@ -6661,7 +6657,7 @@
           </a:ln>
           <a:extLst>
             <a:ext uri="{C572A759-6A51-4108-AA02-DFA0A04FC94B}">
-              <ma14:wrappingTextBoxFlag xmlns="" xmlns:m="http://schemas.openxmlformats.org/officeDocument/2006/math" xmlns:a14="http://schemas.microsoft.com/office/drawing/2010/main" xmlns:ma14="http://schemas.microsoft.com/office/mac/drawingml/2011/main" val="1"/>
+              <ma14:wrappingTextBoxFlag xmlns:ma14="http://schemas.microsoft.com/office/mac/drawingml/2011/main" xmlns:a14="http://schemas.microsoft.com/office/drawing/2010/main" xmlns:m="http://schemas.openxmlformats.org/officeDocument/2006/math" xmlns="" val="1"/>
             </a:ext>
           </a:extLst>
         </p:spPr>
@@ -6854,7 +6850,7 @@
           </a:ln>
           <a:extLst>
             <a:ext uri="{C572A759-6A51-4108-AA02-DFA0A04FC94B}">
-              <ma14:wrappingTextBoxFlag xmlns="" xmlns:m="http://schemas.openxmlformats.org/officeDocument/2006/math" xmlns:a14="http://schemas.microsoft.com/office/drawing/2010/main" xmlns:ma14="http://schemas.microsoft.com/office/mac/drawingml/2011/main" val="1"/>
+              <ma14:wrappingTextBoxFlag xmlns:ma14="http://schemas.microsoft.com/office/mac/drawingml/2011/main" xmlns:a14="http://schemas.microsoft.com/office/drawing/2010/main" xmlns:m="http://schemas.openxmlformats.org/officeDocument/2006/math" xmlns="" val="1"/>
             </a:ext>
           </a:extLst>
         </p:spPr>
@@ -6906,7 +6902,7 @@
           </a:ln>
           <a:extLst>
             <a:ext uri="{C572A759-6A51-4108-AA02-DFA0A04FC94B}">
-              <ma14:wrappingTextBoxFlag xmlns="" xmlns:m="http://schemas.openxmlformats.org/officeDocument/2006/math" xmlns:a14="http://schemas.microsoft.com/office/drawing/2010/main" xmlns:ma14="http://schemas.microsoft.com/office/mac/drawingml/2011/main" val="1"/>
+              <ma14:wrappingTextBoxFlag xmlns:ma14="http://schemas.microsoft.com/office/mac/drawingml/2011/main" xmlns:a14="http://schemas.microsoft.com/office/drawing/2010/main" xmlns:m="http://schemas.openxmlformats.org/officeDocument/2006/math" xmlns="" val="1"/>
             </a:ext>
           </a:extLst>
         </p:spPr>
@@ -6956,7 +6952,7 @@
           </a:ln>
           <a:extLst>
             <a:ext uri="{C572A759-6A51-4108-AA02-DFA0A04FC94B}">
-              <ma14:wrappingTextBoxFlag xmlns="" xmlns:m="http://schemas.openxmlformats.org/officeDocument/2006/math" xmlns:a14="http://schemas.microsoft.com/office/drawing/2010/main" xmlns:ma14="http://schemas.microsoft.com/office/mac/drawingml/2011/main" val="1"/>
+              <ma14:wrappingTextBoxFlag xmlns:ma14="http://schemas.microsoft.com/office/mac/drawingml/2011/main" xmlns:a14="http://schemas.microsoft.com/office/drawing/2010/main" xmlns:m="http://schemas.openxmlformats.org/officeDocument/2006/math" xmlns="" val="1"/>
             </a:ext>
           </a:extLst>
         </p:spPr>
@@ -7749,7 +7745,7 @@
             <a:effectLst/>
             <a:extLst>
               <a:ext uri="{C572A759-6A51-4108-AA02-DFA0A04FC94B}">
-                <ma14:wrappingTextBoxFlag xmlns="" xmlns:m="http://schemas.openxmlformats.org/officeDocument/2006/math" xmlns:a14="http://schemas.microsoft.com/office/drawing/2010/main" xmlns:ma14="http://schemas.microsoft.com/office/mac/drawingml/2011/main" val="1"/>
+                <ma14:wrappingTextBoxFlag xmlns:ma14="http://schemas.microsoft.com/office/mac/drawingml/2011/main" xmlns:a14="http://schemas.microsoft.com/office/drawing/2010/main" xmlns:m="http://schemas.openxmlformats.org/officeDocument/2006/math" xmlns="" val="1"/>
               </a:ext>
             </a:extLst>
           </p:spPr>
@@ -8612,7 +8608,7 @@
             <a:effectLst/>
             <a:extLst>
               <a:ext uri="{C572A759-6A51-4108-AA02-DFA0A04FC94B}">
-                <ma14:wrappingTextBoxFlag xmlns="" xmlns:m="http://schemas.openxmlformats.org/officeDocument/2006/math" xmlns:a14="http://schemas.microsoft.com/office/drawing/2010/main" xmlns:ma14="http://schemas.microsoft.com/office/mac/drawingml/2011/main" val="1"/>
+                <ma14:wrappingTextBoxFlag xmlns:ma14="http://schemas.microsoft.com/office/mac/drawingml/2011/main" xmlns:a14="http://schemas.microsoft.com/office/drawing/2010/main" xmlns:m="http://schemas.openxmlformats.org/officeDocument/2006/math" xmlns="" val="1"/>
               </a:ext>
             </a:extLst>
           </p:spPr>
@@ -9534,7 +9530,7 @@
             <a:effectLst/>
             <a:extLst>
               <a:ext uri="{C572A759-6A51-4108-AA02-DFA0A04FC94B}">
-                <ma14:wrappingTextBoxFlag xmlns="" xmlns:m="http://schemas.openxmlformats.org/officeDocument/2006/math" xmlns:a14="http://schemas.microsoft.com/office/drawing/2010/main" xmlns:ma14="http://schemas.microsoft.com/office/mac/drawingml/2011/main" val="1"/>
+                <ma14:wrappingTextBoxFlag xmlns:ma14="http://schemas.microsoft.com/office/mac/drawingml/2011/main" xmlns:a14="http://schemas.microsoft.com/office/drawing/2010/main" xmlns:m="http://schemas.openxmlformats.org/officeDocument/2006/math" xmlns="" val="1"/>
               </a:ext>
             </a:extLst>
           </p:spPr>
@@ -9644,7 +9640,7 @@
           </a:ln>
           <a:extLst>
             <a:ext uri="{C572A759-6A51-4108-AA02-DFA0A04FC94B}">
-              <ma14:wrappingTextBoxFlag xmlns="" xmlns:m="http://schemas.openxmlformats.org/officeDocument/2006/math" xmlns:a14="http://schemas.microsoft.com/office/drawing/2010/main" xmlns:ma14="http://schemas.microsoft.com/office/mac/drawingml/2011/main" val="1"/>
+              <ma14:wrappingTextBoxFlag xmlns:ma14="http://schemas.microsoft.com/office/mac/drawingml/2011/main" xmlns:a14="http://schemas.microsoft.com/office/drawing/2010/main" xmlns:m="http://schemas.openxmlformats.org/officeDocument/2006/math" xmlns="" val="1"/>
             </a:ext>
           </a:extLst>
         </p:spPr>
@@ -9845,7 +9841,7 @@
           </a:ln>
           <a:extLst>
             <a:ext uri="{C572A759-6A51-4108-AA02-DFA0A04FC94B}">
-              <ma14:wrappingTextBoxFlag xmlns="" xmlns:m="http://schemas.openxmlformats.org/officeDocument/2006/math" xmlns:a14="http://schemas.microsoft.com/office/drawing/2010/main" xmlns:ma14="http://schemas.microsoft.com/office/mac/drawingml/2011/main" val="1"/>
+              <ma14:wrappingTextBoxFlag xmlns:ma14="http://schemas.microsoft.com/office/mac/drawingml/2011/main" xmlns:a14="http://schemas.microsoft.com/office/drawing/2010/main" xmlns:m="http://schemas.openxmlformats.org/officeDocument/2006/math" xmlns="" val="1"/>
             </a:ext>
           </a:extLst>
         </p:spPr>
@@ -9947,7 +9943,7 @@
           </a:ln>
           <a:extLst>
             <a:ext uri="{C572A759-6A51-4108-AA02-DFA0A04FC94B}">
-              <ma14:wrappingTextBoxFlag xmlns="" xmlns:m="http://schemas.openxmlformats.org/officeDocument/2006/math" xmlns:a14="http://schemas.microsoft.com/office/drawing/2010/main" xmlns:ma14="http://schemas.microsoft.com/office/mac/drawingml/2011/main" val="1"/>
+              <ma14:wrappingTextBoxFlag xmlns:ma14="http://schemas.microsoft.com/office/mac/drawingml/2011/main" xmlns:a14="http://schemas.microsoft.com/office/drawing/2010/main" xmlns:m="http://schemas.openxmlformats.org/officeDocument/2006/math" xmlns="" val="1"/>
             </a:ext>
           </a:extLst>
         </p:spPr>
@@ -10756,7 +10752,7 @@
           </a:ln>
           <a:extLst>
             <a:ext uri="{C572A759-6A51-4108-AA02-DFA0A04FC94B}">
-              <ma14:wrappingTextBoxFlag xmlns="" xmlns:m="http://schemas.openxmlformats.org/officeDocument/2006/math" xmlns:a14="http://schemas.microsoft.com/office/drawing/2010/main" xmlns:ma14="http://schemas.microsoft.com/office/mac/drawingml/2011/main" val="1"/>
+              <ma14:wrappingTextBoxFlag xmlns:ma14="http://schemas.microsoft.com/office/mac/drawingml/2011/main" xmlns:a14="http://schemas.microsoft.com/office/drawing/2010/main" xmlns:m="http://schemas.openxmlformats.org/officeDocument/2006/math" xmlns="" val="1"/>
             </a:ext>
           </a:extLst>
         </p:spPr>
@@ -10906,7 +10902,7 @@
           </a:ln>
           <a:extLst>
             <a:ext uri="{C572A759-6A51-4108-AA02-DFA0A04FC94B}">
-              <ma14:wrappingTextBoxFlag xmlns="" xmlns:m="http://schemas.openxmlformats.org/officeDocument/2006/math" xmlns:a14="http://schemas.microsoft.com/office/drawing/2010/main" xmlns:ma14="http://schemas.microsoft.com/office/mac/drawingml/2011/main" val="1"/>
+              <ma14:wrappingTextBoxFlag xmlns:ma14="http://schemas.microsoft.com/office/mac/drawingml/2011/main" xmlns:a14="http://schemas.microsoft.com/office/drawing/2010/main" xmlns:m="http://schemas.openxmlformats.org/officeDocument/2006/math" xmlns="" val="1"/>
             </a:ext>
           </a:extLst>
         </p:spPr>
@@ -11007,7 +11003,7 @@
           </a:ln>
           <a:extLst>
             <a:ext uri="{C572A759-6A51-4108-AA02-DFA0A04FC94B}">
-              <ma14:wrappingTextBoxFlag xmlns="" xmlns:m="http://schemas.openxmlformats.org/officeDocument/2006/math" xmlns:a14="http://schemas.microsoft.com/office/drawing/2010/main" xmlns:ma14="http://schemas.microsoft.com/office/mac/drawingml/2011/main" val="1"/>
+              <ma14:wrappingTextBoxFlag xmlns:ma14="http://schemas.microsoft.com/office/mac/drawingml/2011/main" xmlns:a14="http://schemas.microsoft.com/office/drawing/2010/main" xmlns:m="http://schemas.openxmlformats.org/officeDocument/2006/math" xmlns="" val="1"/>
             </a:ext>
           </a:extLst>
         </p:spPr>
@@ -11117,7 +11113,7 @@
           </a:ln>
           <a:extLst>
             <a:ext uri="{C572A759-6A51-4108-AA02-DFA0A04FC94B}">
-              <ma14:wrappingTextBoxFlag xmlns="" xmlns:m="http://schemas.openxmlformats.org/officeDocument/2006/math" xmlns:a14="http://schemas.microsoft.com/office/drawing/2010/main" xmlns:ma14="http://schemas.microsoft.com/office/mac/drawingml/2011/main" val="1"/>
+              <ma14:wrappingTextBoxFlag xmlns:ma14="http://schemas.microsoft.com/office/mac/drawingml/2011/main" xmlns:a14="http://schemas.microsoft.com/office/drawing/2010/main" xmlns:m="http://schemas.openxmlformats.org/officeDocument/2006/math" xmlns="" val="1"/>
             </a:ext>
           </a:extLst>
         </p:spPr>
@@ -11170,7 +11166,7 @@
           </a:ln>
           <a:extLst>
             <a:ext uri="{C572A759-6A51-4108-AA02-DFA0A04FC94B}">
-              <ma14:wrappingTextBoxFlag xmlns="" xmlns:m="http://schemas.openxmlformats.org/officeDocument/2006/math" xmlns:a14="http://schemas.microsoft.com/office/drawing/2010/main" xmlns:ma14="http://schemas.microsoft.com/office/mac/drawingml/2011/main" val="1"/>
+              <ma14:wrappingTextBoxFlag xmlns:ma14="http://schemas.microsoft.com/office/mac/drawingml/2011/main" xmlns:a14="http://schemas.microsoft.com/office/drawing/2010/main" xmlns:m="http://schemas.openxmlformats.org/officeDocument/2006/math" xmlns="" val="1"/>
             </a:ext>
           </a:extLst>
         </p:spPr>
@@ -11222,7 +11218,7 @@
           </a:ln>
           <a:extLst>
             <a:ext uri="{C572A759-6A51-4108-AA02-DFA0A04FC94B}">
-              <ma14:wrappingTextBoxFlag xmlns="" xmlns:m="http://schemas.openxmlformats.org/officeDocument/2006/math" xmlns:a14="http://schemas.microsoft.com/office/drawing/2010/main" xmlns:ma14="http://schemas.microsoft.com/office/mac/drawingml/2011/main" val="1"/>
+              <ma14:wrappingTextBoxFlag xmlns:ma14="http://schemas.microsoft.com/office/mac/drawingml/2011/main" xmlns:a14="http://schemas.microsoft.com/office/drawing/2010/main" xmlns:m="http://schemas.openxmlformats.org/officeDocument/2006/math" xmlns="" val="1"/>
             </a:ext>
           </a:extLst>
         </p:spPr>
@@ -11871,7 +11867,7 @@
           </a:ln>
           <a:extLst>
             <a:ext uri="{C572A759-6A51-4108-AA02-DFA0A04FC94B}">
-              <ma14:wrappingTextBoxFlag xmlns="" xmlns:m="http://schemas.openxmlformats.org/officeDocument/2006/math" xmlns:a14="http://schemas.microsoft.com/office/drawing/2010/main" xmlns:ma14="http://schemas.microsoft.com/office/mac/drawingml/2011/main" val="1"/>
+              <ma14:wrappingTextBoxFlag xmlns:ma14="http://schemas.microsoft.com/office/mac/drawingml/2011/main" xmlns:a14="http://schemas.microsoft.com/office/drawing/2010/main" xmlns:m="http://schemas.openxmlformats.org/officeDocument/2006/math" xmlns="" val="1"/>
             </a:ext>
           </a:extLst>
         </p:spPr>
@@ -11975,7 +11971,7 @@
           </a:ln>
           <a:extLst>
             <a:ext uri="{C572A759-6A51-4108-AA02-DFA0A04FC94B}">
-              <ma14:wrappingTextBoxFlag xmlns="" xmlns:m="http://schemas.openxmlformats.org/officeDocument/2006/math" xmlns:a14="http://schemas.microsoft.com/office/drawing/2010/main" xmlns:ma14="http://schemas.microsoft.com/office/mac/drawingml/2011/main" val="1"/>
+              <ma14:wrappingTextBoxFlag xmlns:ma14="http://schemas.microsoft.com/office/mac/drawingml/2011/main" xmlns:a14="http://schemas.microsoft.com/office/drawing/2010/main" xmlns:m="http://schemas.openxmlformats.org/officeDocument/2006/math" xmlns="" val="1"/>
             </a:ext>
           </a:extLst>
         </p:spPr>
@@ -12025,7 +12021,7 @@
           </a:ln>
           <a:extLst>
             <a:ext uri="{C572A759-6A51-4108-AA02-DFA0A04FC94B}">
-              <ma14:wrappingTextBoxFlag xmlns="" xmlns:m="http://schemas.openxmlformats.org/officeDocument/2006/math" xmlns:a14="http://schemas.microsoft.com/office/drawing/2010/main" xmlns:ma14="http://schemas.microsoft.com/office/mac/drawingml/2011/main" val="1"/>
+              <ma14:wrappingTextBoxFlag xmlns:ma14="http://schemas.microsoft.com/office/mac/drawingml/2011/main" xmlns:a14="http://schemas.microsoft.com/office/drawing/2010/main" xmlns:m="http://schemas.openxmlformats.org/officeDocument/2006/math" xmlns="" val="1"/>
             </a:ext>
           </a:extLst>
         </p:spPr>
@@ -12138,7 +12134,7 @@
             <a:effectLst/>
             <a:extLst>
               <a:ext uri="{C572A759-6A51-4108-AA02-DFA0A04FC94B}">
-                <ma14:wrappingTextBoxFlag xmlns="" xmlns:m="http://schemas.openxmlformats.org/officeDocument/2006/math" xmlns:a14="http://schemas.microsoft.com/office/drawing/2010/main" xmlns:ma14="http://schemas.microsoft.com/office/mac/drawingml/2011/main" val="1"/>
+                <ma14:wrappingTextBoxFlag xmlns:ma14="http://schemas.microsoft.com/office/mac/drawingml/2011/main" xmlns:a14="http://schemas.microsoft.com/office/drawing/2010/main" xmlns:m="http://schemas.openxmlformats.org/officeDocument/2006/math" xmlns="" val="1"/>
               </a:ext>
             </a:extLst>
           </p:spPr>
@@ -14239,7 +14235,7 @@
             <a:effectLst/>
             <a:extLst>
               <a:ext uri="{C572A759-6A51-4108-AA02-DFA0A04FC94B}">
-                <ma14:wrappingTextBoxFlag xmlns="" xmlns:m="http://schemas.openxmlformats.org/officeDocument/2006/math" xmlns:a14="http://schemas.microsoft.com/office/drawing/2010/main" xmlns:ma14="http://schemas.microsoft.com/office/mac/drawingml/2011/main" val="1"/>
+                <ma14:wrappingTextBoxFlag xmlns:ma14="http://schemas.microsoft.com/office/mac/drawingml/2011/main" xmlns:a14="http://schemas.microsoft.com/office/drawing/2010/main" xmlns:m="http://schemas.openxmlformats.org/officeDocument/2006/math" xmlns="" val="1"/>
               </a:ext>
             </a:extLst>
           </p:spPr>
@@ -15803,7 +15799,7 @@
           </a:ln>
           <a:extLst>
             <a:ext uri="{C572A759-6A51-4108-AA02-DFA0A04FC94B}">
-              <ma14:wrappingTextBoxFlag xmlns="" xmlns:m="http://schemas.openxmlformats.org/officeDocument/2006/math" xmlns:a14="http://schemas.microsoft.com/office/drawing/2010/main" xmlns:ma14="http://schemas.microsoft.com/office/mac/drawingml/2011/main" val="1"/>
+              <ma14:wrappingTextBoxFlag xmlns:ma14="http://schemas.microsoft.com/office/mac/drawingml/2011/main" xmlns:a14="http://schemas.microsoft.com/office/drawing/2010/main" xmlns:m="http://schemas.openxmlformats.org/officeDocument/2006/math" xmlns="" val="1"/>
             </a:ext>
           </a:extLst>
         </p:spPr>
@@ -16820,7 +16816,7 @@
             <a:effectLst/>
             <a:extLst>
               <a:ext uri="{C572A759-6A51-4108-AA02-DFA0A04FC94B}">
-                <ma14:wrappingTextBoxFlag xmlns="" xmlns:m="http://schemas.openxmlformats.org/officeDocument/2006/math" xmlns:a14="http://schemas.microsoft.com/office/drawing/2010/main" xmlns:ma14="http://schemas.microsoft.com/office/mac/drawingml/2011/main" val="1"/>
+                <ma14:wrappingTextBoxFlag xmlns:ma14="http://schemas.microsoft.com/office/mac/drawingml/2011/main" xmlns:a14="http://schemas.microsoft.com/office/drawing/2010/main" xmlns:m="http://schemas.openxmlformats.org/officeDocument/2006/math" xmlns="" val="1"/>
               </a:ext>
             </a:extLst>
           </p:spPr>
@@ -18503,7 +18499,7 @@
           </a:ln>
           <a:extLst>
             <a:ext uri="{C572A759-6A51-4108-AA02-DFA0A04FC94B}">
-              <ma14:wrappingTextBoxFlag xmlns="" xmlns:m="http://schemas.openxmlformats.org/officeDocument/2006/math" xmlns:a14="http://schemas.microsoft.com/office/drawing/2010/main" xmlns:ma14="http://schemas.microsoft.com/office/mac/drawingml/2011/main" val="1"/>
+              <ma14:wrappingTextBoxFlag xmlns:ma14="http://schemas.microsoft.com/office/mac/drawingml/2011/main" xmlns:a14="http://schemas.microsoft.com/office/drawing/2010/main" xmlns:m="http://schemas.openxmlformats.org/officeDocument/2006/math" xmlns="" val="1"/>
             </a:ext>
           </a:extLst>
         </p:spPr>
@@ -23308,7 +23304,7 @@
           </a:ln>
           <a:extLst>
             <a:ext uri="{C572A759-6A51-4108-AA02-DFA0A04FC94B}">
-              <ma14:wrappingTextBoxFlag xmlns="" xmlns:m="http://schemas.openxmlformats.org/officeDocument/2006/math" xmlns:a14="http://schemas.microsoft.com/office/drawing/2010/main" xmlns:ma14="http://schemas.microsoft.com/office/mac/drawingml/2011/main" val="1"/>
+              <ma14:wrappingTextBoxFlag xmlns:ma14="http://schemas.microsoft.com/office/mac/drawingml/2011/main" xmlns:a14="http://schemas.microsoft.com/office/drawing/2010/main" xmlns:m="http://schemas.openxmlformats.org/officeDocument/2006/math" xmlns="" val="1"/>
             </a:ext>
           </a:extLst>
         </p:spPr>
@@ -23580,7 +23576,7 @@
           </a:ln>
           <a:extLst>
             <a:ext uri="{C572A759-6A51-4108-AA02-DFA0A04FC94B}">
-              <ma14:wrappingTextBoxFlag xmlns="" xmlns:m="http://schemas.openxmlformats.org/officeDocument/2006/math" xmlns:a14="http://schemas.microsoft.com/office/drawing/2010/main" xmlns:ma14="http://schemas.microsoft.com/office/mac/drawingml/2011/main" val="1"/>
+              <ma14:wrappingTextBoxFlag xmlns:ma14="http://schemas.microsoft.com/office/mac/drawingml/2011/main" xmlns:a14="http://schemas.microsoft.com/office/drawing/2010/main" xmlns:m="http://schemas.openxmlformats.org/officeDocument/2006/math" xmlns="" val="1"/>
             </a:ext>
           </a:extLst>
         </p:spPr>
@@ -23754,7 +23750,7 @@
           </a:ln>
           <a:extLst>
             <a:ext uri="{C572A759-6A51-4108-AA02-DFA0A04FC94B}">
-              <ma14:wrappingTextBoxFlag xmlns="" xmlns:m="http://schemas.openxmlformats.org/officeDocument/2006/math" xmlns:a14="http://schemas.microsoft.com/office/drawing/2010/main" xmlns:ma14="http://schemas.microsoft.com/office/mac/drawingml/2011/main" val="1"/>
+              <ma14:wrappingTextBoxFlag xmlns:ma14="http://schemas.microsoft.com/office/mac/drawingml/2011/main" xmlns:a14="http://schemas.microsoft.com/office/drawing/2010/main" xmlns:m="http://schemas.openxmlformats.org/officeDocument/2006/math" xmlns="" val="1"/>
             </a:ext>
           </a:extLst>
         </p:spPr>
@@ -24035,7 +24031,7 @@
           </a:ln>
           <a:extLst>
             <a:ext uri="{C572A759-6A51-4108-AA02-DFA0A04FC94B}">
-              <ma14:wrappingTextBoxFlag xmlns="" xmlns:m="http://schemas.openxmlformats.org/officeDocument/2006/math" xmlns:a14="http://schemas.microsoft.com/office/drawing/2010/main" xmlns:ma14="http://schemas.microsoft.com/office/mac/drawingml/2011/main" val="1"/>
+              <ma14:wrappingTextBoxFlag xmlns:ma14="http://schemas.microsoft.com/office/mac/drawingml/2011/main" xmlns:a14="http://schemas.microsoft.com/office/drawing/2010/main" xmlns:m="http://schemas.openxmlformats.org/officeDocument/2006/math" xmlns="" val="1"/>
             </a:ext>
           </a:extLst>
         </p:spPr>
@@ -24087,7 +24083,7 @@
           </a:ln>
           <a:extLst>
             <a:ext uri="{C572A759-6A51-4108-AA02-DFA0A04FC94B}">
-              <ma14:wrappingTextBoxFlag xmlns="" xmlns:m="http://schemas.openxmlformats.org/officeDocument/2006/math" xmlns:a14="http://schemas.microsoft.com/office/drawing/2010/main" xmlns:ma14="http://schemas.microsoft.com/office/mac/drawingml/2011/main" val="1"/>
+              <ma14:wrappingTextBoxFlag xmlns:ma14="http://schemas.microsoft.com/office/mac/drawingml/2011/main" xmlns:a14="http://schemas.microsoft.com/office/drawing/2010/main" xmlns:m="http://schemas.openxmlformats.org/officeDocument/2006/math" xmlns="" val="1"/>
             </a:ext>
           </a:extLst>
         </p:spPr>
@@ -24140,7 +24136,7 @@
             <a:effectLst/>
             <a:extLst>
               <a:ext uri="{C572A759-6A51-4108-AA02-DFA0A04FC94B}">
-                <ma14:wrappingTextBoxFlag xmlns="" xmlns:m="http://schemas.openxmlformats.org/officeDocument/2006/math" xmlns:a14="http://schemas.microsoft.com/office/drawing/2010/main" xmlns:ma14="http://schemas.microsoft.com/office/mac/drawingml/2011/main" val="1"/>
+                <ma14:wrappingTextBoxFlag xmlns:ma14="http://schemas.microsoft.com/office/mac/drawingml/2011/main" xmlns:a14="http://schemas.microsoft.com/office/drawing/2010/main" xmlns:m="http://schemas.openxmlformats.org/officeDocument/2006/math" xmlns="" val="1"/>
               </a:ext>
             </a:extLst>
           </p:spPr>
@@ -24193,7 +24189,7 @@
             <a:effectLst/>
             <a:extLst>
               <a:ext uri="{C572A759-6A51-4108-AA02-DFA0A04FC94B}">
-                <ma14:wrappingTextBoxFlag xmlns="" xmlns:m="http://schemas.openxmlformats.org/officeDocument/2006/math" xmlns:a14="http://schemas.microsoft.com/office/drawing/2010/main" xmlns:ma14="http://schemas.microsoft.com/office/mac/drawingml/2011/main" val="1"/>
+                <ma14:wrappingTextBoxFlag xmlns:ma14="http://schemas.microsoft.com/office/mac/drawingml/2011/main" xmlns:a14="http://schemas.microsoft.com/office/drawing/2010/main" xmlns:m="http://schemas.openxmlformats.org/officeDocument/2006/math" xmlns="" val="1"/>
               </a:ext>
             </a:extLst>
           </p:spPr>
@@ -29384,7 +29380,7 @@
           </a:ln>
           <a:extLst>
             <a:ext uri="{C572A759-6A51-4108-AA02-DFA0A04FC94B}">
-              <ma14:wrappingTextBoxFlag xmlns="" xmlns:m="http://schemas.openxmlformats.org/officeDocument/2006/math" xmlns:a14="http://schemas.microsoft.com/office/drawing/2010/main" xmlns:ma14="http://schemas.microsoft.com/office/mac/drawingml/2011/main" val="1"/>
+              <ma14:wrappingTextBoxFlag xmlns:ma14="http://schemas.microsoft.com/office/mac/drawingml/2011/main" xmlns:a14="http://schemas.microsoft.com/office/drawing/2010/main" xmlns:m="http://schemas.openxmlformats.org/officeDocument/2006/math" xmlns="" val="1"/>
             </a:ext>
           </a:extLst>
         </p:spPr>
@@ -29445,7 +29441,7 @@
           </a:ln>
           <a:extLst>
             <a:ext uri="{C572A759-6A51-4108-AA02-DFA0A04FC94B}">
-              <ma14:wrappingTextBoxFlag xmlns="" xmlns:m="http://schemas.openxmlformats.org/officeDocument/2006/math" xmlns:a14="http://schemas.microsoft.com/office/drawing/2010/main" xmlns:ma14="http://schemas.microsoft.com/office/mac/drawingml/2011/main" val="1"/>
+              <ma14:wrappingTextBoxFlag xmlns:ma14="http://schemas.microsoft.com/office/mac/drawingml/2011/main" xmlns:a14="http://schemas.microsoft.com/office/drawing/2010/main" xmlns:m="http://schemas.openxmlformats.org/officeDocument/2006/math" xmlns="" val="1"/>
             </a:ext>
           </a:extLst>
         </p:spPr>
@@ -29481,7 +29477,7 @@
           </a:ln>
           <a:extLst>
             <a:ext uri="{C572A759-6A51-4108-AA02-DFA0A04FC94B}">
-              <ma14:wrappingTextBoxFlag xmlns="" xmlns:m="http://schemas.openxmlformats.org/officeDocument/2006/math" xmlns:a14="http://schemas.microsoft.com/office/drawing/2010/main" xmlns:ma14="http://schemas.microsoft.com/office/mac/drawingml/2011/main" val="1"/>
+              <ma14:wrappingTextBoxFlag xmlns:ma14="http://schemas.microsoft.com/office/mac/drawingml/2011/main" xmlns:a14="http://schemas.microsoft.com/office/drawing/2010/main" xmlns:m="http://schemas.openxmlformats.org/officeDocument/2006/math" xmlns="" val="1"/>
             </a:ext>
           </a:extLst>
         </p:spPr>
@@ -29971,7 +29967,7 @@
           </a:ln>
           <a:extLst>
             <a:ext uri="{C572A759-6A51-4108-AA02-DFA0A04FC94B}">
-              <ma14:wrappingTextBoxFlag xmlns="" xmlns:m="http://schemas.openxmlformats.org/officeDocument/2006/math" xmlns:a14="http://schemas.microsoft.com/office/drawing/2010/main" xmlns:ma14="http://schemas.microsoft.com/office/mac/drawingml/2011/main" val="1"/>
+              <ma14:wrappingTextBoxFlag xmlns:ma14="http://schemas.microsoft.com/office/mac/drawingml/2011/main" xmlns:a14="http://schemas.microsoft.com/office/drawing/2010/main" xmlns:m="http://schemas.openxmlformats.org/officeDocument/2006/math" xmlns="" val="1"/>
             </a:ext>
           </a:extLst>
         </p:spPr>
@@ -30055,7 +30051,7 @@
           </a:ln>
           <a:extLst>
             <a:ext uri="{C572A759-6A51-4108-AA02-DFA0A04FC94B}">
-              <ma14:wrappingTextBoxFlag xmlns="" xmlns:m="http://schemas.openxmlformats.org/officeDocument/2006/math" xmlns:a14="http://schemas.microsoft.com/office/drawing/2010/main" xmlns:ma14="http://schemas.microsoft.com/office/mac/drawingml/2011/main" val="1"/>
+              <ma14:wrappingTextBoxFlag xmlns:ma14="http://schemas.microsoft.com/office/mac/drawingml/2011/main" xmlns:a14="http://schemas.microsoft.com/office/drawing/2010/main" xmlns:m="http://schemas.openxmlformats.org/officeDocument/2006/math" xmlns="" val="1"/>
             </a:ext>
           </a:extLst>
         </p:spPr>
@@ -30139,7 +30135,7 @@
           </a:ln>
           <a:extLst>
             <a:ext uri="{C572A759-6A51-4108-AA02-DFA0A04FC94B}">
-              <ma14:wrappingTextBoxFlag xmlns="" xmlns:m="http://schemas.openxmlformats.org/officeDocument/2006/math" xmlns:a14="http://schemas.microsoft.com/office/drawing/2010/main" xmlns:ma14="http://schemas.microsoft.com/office/mac/drawingml/2011/main" val="1"/>
+              <ma14:wrappingTextBoxFlag xmlns:ma14="http://schemas.microsoft.com/office/mac/drawingml/2011/main" xmlns:a14="http://schemas.microsoft.com/office/drawing/2010/main" xmlns:m="http://schemas.openxmlformats.org/officeDocument/2006/math" xmlns="" val="1"/>
             </a:ext>
           </a:extLst>
         </p:spPr>
@@ -30199,7 +30195,7 @@
           </a:ln>
           <a:extLst>
             <a:ext uri="{C572A759-6A51-4108-AA02-DFA0A04FC94B}">
-              <ma14:wrappingTextBoxFlag xmlns="" xmlns:m="http://schemas.openxmlformats.org/officeDocument/2006/math" xmlns:a14="http://schemas.microsoft.com/office/drawing/2010/main" xmlns:ma14="http://schemas.microsoft.com/office/mac/drawingml/2011/main" val="1"/>
+              <ma14:wrappingTextBoxFlag xmlns:ma14="http://schemas.microsoft.com/office/mac/drawingml/2011/main" xmlns:a14="http://schemas.microsoft.com/office/drawing/2010/main" xmlns:m="http://schemas.openxmlformats.org/officeDocument/2006/math" xmlns="" val="1"/>
             </a:ext>
           </a:extLst>
         </p:spPr>
@@ -30260,7 +30256,7 @@
           </a:ln>
           <a:extLst>
             <a:ext uri="{C572A759-6A51-4108-AA02-DFA0A04FC94B}">
-              <ma14:wrappingTextBoxFlag xmlns="" xmlns:m="http://schemas.openxmlformats.org/officeDocument/2006/math" xmlns:a14="http://schemas.microsoft.com/office/drawing/2010/main" xmlns:ma14="http://schemas.microsoft.com/office/mac/drawingml/2011/main" val="1"/>
+              <ma14:wrappingTextBoxFlag xmlns:ma14="http://schemas.microsoft.com/office/mac/drawingml/2011/main" xmlns:a14="http://schemas.microsoft.com/office/drawing/2010/main" xmlns:m="http://schemas.openxmlformats.org/officeDocument/2006/math" xmlns="" val="1"/>
             </a:ext>
           </a:extLst>
         </p:spPr>
@@ -30321,7 +30317,7 @@
           </a:ln>
           <a:extLst>
             <a:ext uri="{C572A759-6A51-4108-AA02-DFA0A04FC94B}">
-              <ma14:wrappingTextBoxFlag xmlns="" xmlns:m="http://schemas.openxmlformats.org/officeDocument/2006/math" xmlns:a14="http://schemas.microsoft.com/office/drawing/2010/main" xmlns:ma14="http://schemas.microsoft.com/office/mac/drawingml/2011/main" val="1"/>
+              <ma14:wrappingTextBoxFlag xmlns:ma14="http://schemas.microsoft.com/office/mac/drawingml/2011/main" xmlns:a14="http://schemas.microsoft.com/office/drawing/2010/main" xmlns:m="http://schemas.openxmlformats.org/officeDocument/2006/math" xmlns="" val="1"/>
             </a:ext>
           </a:extLst>
         </p:spPr>
@@ -30394,7 +30390,7 @@
           </a:ln>
           <a:extLst>
             <a:ext uri="{C572A759-6A51-4108-AA02-DFA0A04FC94B}">
-              <ma14:wrappingTextBoxFlag xmlns="" xmlns:m="http://schemas.openxmlformats.org/officeDocument/2006/math" xmlns:a14="http://schemas.microsoft.com/office/drawing/2010/main" xmlns:ma14="http://schemas.microsoft.com/office/mac/drawingml/2011/main" val="1"/>
+              <ma14:wrappingTextBoxFlag xmlns:ma14="http://schemas.microsoft.com/office/mac/drawingml/2011/main" xmlns:a14="http://schemas.microsoft.com/office/drawing/2010/main" xmlns:m="http://schemas.openxmlformats.org/officeDocument/2006/math" xmlns="" val="1"/>
             </a:ext>
           </a:extLst>
         </p:spPr>
@@ -30742,7 +30738,7 @@
               <a:effectLst/>
               <a:extLst>
                 <a:ext uri="{C572A759-6A51-4108-AA02-DFA0A04FC94B}">
-                  <ma14:wrappingTextBoxFlag xmlns="" xmlns:m="http://schemas.openxmlformats.org/officeDocument/2006/math" xmlns:a14="http://schemas.microsoft.com/office/drawing/2010/main" xmlns:ma14="http://schemas.microsoft.com/office/mac/drawingml/2011/main" val="1"/>
+                  <ma14:wrappingTextBoxFlag xmlns:ma14="http://schemas.microsoft.com/office/mac/drawingml/2011/main" xmlns:a14="http://schemas.microsoft.com/office/drawing/2010/main" xmlns:m="http://schemas.openxmlformats.org/officeDocument/2006/math" xmlns="" val="1"/>
                 </a:ext>
               </a:extLst>
             </p:spPr>
@@ -31788,7 +31784,7 @@
           </a:ln>
           <a:extLst>
             <a:ext uri="{C572A759-6A51-4108-AA02-DFA0A04FC94B}">
-              <ma14:wrappingTextBoxFlag xmlns="" xmlns:m="http://schemas.openxmlformats.org/officeDocument/2006/math" xmlns:a14="http://schemas.microsoft.com/office/drawing/2010/main" xmlns:ma14="http://schemas.microsoft.com/office/mac/drawingml/2011/main" val="1"/>
+              <ma14:wrappingTextBoxFlag xmlns:ma14="http://schemas.microsoft.com/office/mac/drawingml/2011/main" xmlns:a14="http://schemas.microsoft.com/office/drawing/2010/main" xmlns:m="http://schemas.openxmlformats.org/officeDocument/2006/math" xmlns="" val="1"/>
             </a:ext>
           </a:extLst>
         </p:spPr>
@@ -31838,7 +31834,7 @@
           </a:ln>
           <a:extLst>
             <a:ext uri="{C572A759-6A51-4108-AA02-DFA0A04FC94B}">
-              <ma14:wrappingTextBoxFlag xmlns="" xmlns:m="http://schemas.openxmlformats.org/officeDocument/2006/math" xmlns:a14="http://schemas.microsoft.com/office/drawing/2010/main" xmlns:ma14="http://schemas.microsoft.com/office/mac/drawingml/2011/main" val="1"/>
+              <ma14:wrappingTextBoxFlag xmlns:ma14="http://schemas.microsoft.com/office/mac/drawingml/2011/main" xmlns:a14="http://schemas.microsoft.com/office/drawing/2010/main" xmlns:m="http://schemas.openxmlformats.org/officeDocument/2006/math" xmlns="" val="1"/>
             </a:ext>
           </a:extLst>
         </p:spPr>
@@ -31874,7 +31870,7 @@
           </a:ln>
           <a:extLst>
             <a:ext uri="{C572A759-6A51-4108-AA02-DFA0A04FC94B}">
-              <ma14:wrappingTextBoxFlag xmlns="" xmlns:m="http://schemas.openxmlformats.org/officeDocument/2006/math" xmlns:a14="http://schemas.microsoft.com/office/drawing/2010/main" xmlns:ma14="http://schemas.microsoft.com/office/mac/drawingml/2011/main" val="1"/>
+              <ma14:wrappingTextBoxFlag xmlns:ma14="http://schemas.microsoft.com/office/mac/drawingml/2011/main" xmlns:a14="http://schemas.microsoft.com/office/drawing/2010/main" xmlns:m="http://schemas.openxmlformats.org/officeDocument/2006/math" xmlns="" val="1"/>
             </a:ext>
           </a:extLst>
         </p:spPr>
@@ -32080,7 +32076,7 @@
           </a:ln>
           <a:extLst>
             <a:ext uri="{C572A759-6A51-4108-AA02-DFA0A04FC94B}">
-              <ma14:wrappingTextBoxFlag xmlns="" xmlns:m="http://schemas.openxmlformats.org/officeDocument/2006/math" xmlns:a14="http://schemas.microsoft.com/office/drawing/2010/main" xmlns:ma14="http://schemas.microsoft.com/office/mac/drawingml/2011/main" val="1"/>
+              <ma14:wrappingTextBoxFlag xmlns:ma14="http://schemas.microsoft.com/office/mac/drawingml/2011/main" xmlns:a14="http://schemas.microsoft.com/office/drawing/2010/main" xmlns:m="http://schemas.openxmlformats.org/officeDocument/2006/math" xmlns="" val="1"/>
             </a:ext>
           </a:extLst>
         </p:spPr>
@@ -32116,7 +32112,7 @@
           </a:ln>
           <a:extLst>
             <a:ext uri="{C572A759-6A51-4108-AA02-DFA0A04FC94B}">
-              <ma14:wrappingTextBoxFlag xmlns="" xmlns:m="http://schemas.openxmlformats.org/officeDocument/2006/math" xmlns:a14="http://schemas.microsoft.com/office/drawing/2010/main" xmlns:ma14="http://schemas.microsoft.com/office/mac/drawingml/2011/main" val="1"/>
+              <ma14:wrappingTextBoxFlag xmlns:ma14="http://schemas.microsoft.com/office/mac/drawingml/2011/main" xmlns:a14="http://schemas.microsoft.com/office/drawing/2010/main" xmlns:m="http://schemas.openxmlformats.org/officeDocument/2006/math" xmlns="" val="1"/>
             </a:ext>
           </a:extLst>
         </p:spPr>
@@ -32393,7 +32389,7 @@
           </a:ln>
           <a:extLst>
             <a:ext uri="{C572A759-6A51-4108-AA02-DFA0A04FC94B}">
-              <ma14:wrappingTextBoxFlag xmlns="" xmlns:m="http://schemas.openxmlformats.org/officeDocument/2006/math" xmlns:a14="http://schemas.microsoft.com/office/drawing/2010/main" xmlns:ma14="http://schemas.microsoft.com/office/mac/drawingml/2011/main" val="1"/>
+              <ma14:wrappingTextBoxFlag xmlns:ma14="http://schemas.microsoft.com/office/mac/drawingml/2011/main" xmlns:a14="http://schemas.microsoft.com/office/drawing/2010/main" xmlns:m="http://schemas.openxmlformats.org/officeDocument/2006/math" xmlns="" val="1"/>
             </a:ext>
           </a:extLst>
         </p:spPr>
@@ -32443,7 +32439,7 @@
           </a:ln>
           <a:extLst>
             <a:ext uri="{C572A759-6A51-4108-AA02-DFA0A04FC94B}">
-              <ma14:wrappingTextBoxFlag xmlns="" xmlns:m="http://schemas.openxmlformats.org/officeDocument/2006/math" xmlns:a14="http://schemas.microsoft.com/office/drawing/2010/main" xmlns:ma14="http://schemas.microsoft.com/office/mac/drawingml/2011/main" val="1"/>
+              <ma14:wrappingTextBoxFlag xmlns:ma14="http://schemas.microsoft.com/office/mac/drawingml/2011/main" xmlns:a14="http://schemas.microsoft.com/office/drawing/2010/main" xmlns:m="http://schemas.openxmlformats.org/officeDocument/2006/math" xmlns="" val="1"/>
             </a:ext>
           </a:extLst>
         </p:spPr>
@@ -32591,7 +32587,7 @@
           </a:ln>
           <a:extLst>
             <a:ext uri="{C572A759-6A51-4108-AA02-DFA0A04FC94B}">
-              <ma14:wrappingTextBoxFlag xmlns="" xmlns:m="http://schemas.openxmlformats.org/officeDocument/2006/math" xmlns:a14="http://schemas.microsoft.com/office/drawing/2010/main" xmlns:ma14="http://schemas.microsoft.com/office/mac/drawingml/2011/main" val="1"/>
+              <ma14:wrappingTextBoxFlag xmlns:ma14="http://schemas.microsoft.com/office/mac/drawingml/2011/main" xmlns:a14="http://schemas.microsoft.com/office/drawing/2010/main" xmlns:m="http://schemas.openxmlformats.org/officeDocument/2006/math" xmlns="" val="1"/>
             </a:ext>
           </a:extLst>
         </p:spPr>
@@ -33547,7 +33543,7 @@
           </a:ln>
           <a:extLst>
             <a:ext uri="{C572A759-6A51-4108-AA02-DFA0A04FC94B}">
-              <ma14:wrappingTextBoxFlag xmlns="" xmlns:m="http://schemas.openxmlformats.org/officeDocument/2006/math" xmlns:a14="http://schemas.microsoft.com/office/drawing/2010/main" xmlns:ma14="http://schemas.microsoft.com/office/mac/drawingml/2011/main" val="1"/>
+              <ma14:wrappingTextBoxFlag xmlns:ma14="http://schemas.microsoft.com/office/mac/drawingml/2011/main" xmlns:a14="http://schemas.microsoft.com/office/drawing/2010/main" xmlns:m="http://schemas.openxmlformats.org/officeDocument/2006/math" xmlns="" val="1"/>
             </a:ext>
           </a:extLst>
         </p:spPr>
@@ -33664,7 +33660,7 @@
           </a:ln>
           <a:extLst>
             <a:ext uri="{C572A759-6A51-4108-AA02-DFA0A04FC94B}">
-              <ma14:wrappingTextBoxFlag xmlns="" xmlns:m="http://schemas.openxmlformats.org/officeDocument/2006/math" xmlns:a14="http://schemas.microsoft.com/office/drawing/2010/main" xmlns:ma14="http://schemas.microsoft.com/office/mac/drawingml/2011/main" val="1"/>
+              <ma14:wrappingTextBoxFlag xmlns:ma14="http://schemas.microsoft.com/office/mac/drawingml/2011/main" xmlns:a14="http://schemas.microsoft.com/office/drawing/2010/main" xmlns:m="http://schemas.openxmlformats.org/officeDocument/2006/math" xmlns="" val="1"/>
             </a:ext>
           </a:extLst>
         </p:spPr>
@@ -35392,7 +35388,7 @@
           </a:ln>
           <a:extLst>
             <a:ext uri="{C572A759-6A51-4108-AA02-DFA0A04FC94B}">
-              <ma14:wrappingTextBoxFlag xmlns="" xmlns:m="http://schemas.openxmlformats.org/officeDocument/2006/math" xmlns:a14="http://schemas.microsoft.com/office/drawing/2010/main" xmlns:ma14="http://schemas.microsoft.com/office/mac/drawingml/2011/main" val="1"/>
+              <ma14:wrappingTextBoxFlag xmlns:ma14="http://schemas.microsoft.com/office/mac/drawingml/2011/main" xmlns:a14="http://schemas.microsoft.com/office/drawing/2010/main" xmlns:m="http://schemas.openxmlformats.org/officeDocument/2006/math" xmlns="" val="1"/>
             </a:ext>
           </a:extLst>
         </p:spPr>
@@ -35480,7 +35476,7 @@
           </a:ln>
           <a:extLst>
             <a:ext uri="{C572A759-6A51-4108-AA02-DFA0A04FC94B}">
-              <ma14:wrappingTextBoxFlag xmlns="" xmlns:m="http://schemas.openxmlformats.org/officeDocument/2006/math" xmlns:a14="http://schemas.microsoft.com/office/drawing/2010/main" xmlns:ma14="http://schemas.microsoft.com/office/mac/drawingml/2011/main" val="1"/>
+              <ma14:wrappingTextBoxFlag xmlns:ma14="http://schemas.microsoft.com/office/mac/drawingml/2011/main" xmlns:a14="http://schemas.microsoft.com/office/drawing/2010/main" xmlns:m="http://schemas.openxmlformats.org/officeDocument/2006/math" xmlns="" val="1"/>
             </a:ext>
           </a:extLst>
         </p:spPr>
@@ -35540,7 +35536,7 @@
           </a:ln>
           <a:extLst>
             <a:ext uri="{C572A759-6A51-4108-AA02-DFA0A04FC94B}">
-              <ma14:wrappingTextBoxFlag xmlns="" xmlns:m="http://schemas.openxmlformats.org/officeDocument/2006/math" xmlns:a14="http://schemas.microsoft.com/office/drawing/2010/main" xmlns:ma14="http://schemas.microsoft.com/office/mac/drawingml/2011/main" val="1"/>
+              <ma14:wrappingTextBoxFlag xmlns:ma14="http://schemas.microsoft.com/office/mac/drawingml/2011/main" xmlns:a14="http://schemas.microsoft.com/office/drawing/2010/main" xmlns:m="http://schemas.openxmlformats.org/officeDocument/2006/math" xmlns="" val="1"/>
             </a:ext>
           </a:extLst>
         </p:spPr>
@@ -35600,7 +35596,7 @@
           </a:ln>
           <a:extLst>
             <a:ext uri="{C572A759-6A51-4108-AA02-DFA0A04FC94B}">
-              <ma14:wrappingTextBoxFlag xmlns="" xmlns:m="http://schemas.openxmlformats.org/officeDocument/2006/math" xmlns:a14="http://schemas.microsoft.com/office/drawing/2010/main" xmlns:ma14="http://schemas.microsoft.com/office/mac/drawingml/2011/main" val="1"/>
+              <ma14:wrappingTextBoxFlag xmlns:ma14="http://schemas.microsoft.com/office/mac/drawingml/2011/main" xmlns:a14="http://schemas.microsoft.com/office/drawing/2010/main" xmlns:m="http://schemas.openxmlformats.org/officeDocument/2006/math" xmlns="" val="1"/>
             </a:ext>
           </a:extLst>
         </p:spPr>
@@ -35660,7 +35656,7 @@
           </a:ln>
           <a:extLst>
             <a:ext uri="{C572A759-6A51-4108-AA02-DFA0A04FC94B}">
-              <ma14:wrappingTextBoxFlag xmlns="" xmlns:m="http://schemas.openxmlformats.org/officeDocument/2006/math" xmlns:a14="http://schemas.microsoft.com/office/drawing/2010/main" xmlns:ma14="http://schemas.microsoft.com/office/mac/drawingml/2011/main" val="1"/>
+              <ma14:wrappingTextBoxFlag xmlns:ma14="http://schemas.microsoft.com/office/mac/drawingml/2011/main" xmlns:a14="http://schemas.microsoft.com/office/drawing/2010/main" xmlns:m="http://schemas.openxmlformats.org/officeDocument/2006/math" xmlns="" val="1"/>
             </a:ext>
           </a:extLst>
         </p:spPr>
@@ -35781,7 +35777,7 @@
           </a:ln>
           <a:extLst>
             <a:ext uri="{C572A759-6A51-4108-AA02-DFA0A04FC94B}">
-              <ma14:wrappingTextBoxFlag xmlns="" xmlns:m="http://schemas.openxmlformats.org/officeDocument/2006/math" xmlns:a14="http://schemas.microsoft.com/office/drawing/2010/main" xmlns:ma14="http://schemas.microsoft.com/office/mac/drawingml/2011/main" val="1"/>
+              <ma14:wrappingTextBoxFlag xmlns:ma14="http://schemas.microsoft.com/office/mac/drawingml/2011/main" xmlns:a14="http://schemas.microsoft.com/office/drawing/2010/main" xmlns:m="http://schemas.openxmlformats.org/officeDocument/2006/math" xmlns="" val="1"/>
             </a:ext>
           </a:extLst>
         </p:spPr>
@@ -36045,7 +36041,7 @@
           </a:ln>
           <a:extLst>
             <a:ext uri="{C572A759-6A51-4108-AA02-DFA0A04FC94B}">
-              <ma14:wrappingTextBoxFlag xmlns="" xmlns:m="http://schemas.openxmlformats.org/officeDocument/2006/math" xmlns:a14="http://schemas.microsoft.com/office/drawing/2010/main" xmlns:ma14="http://schemas.microsoft.com/office/mac/drawingml/2011/main" val="1"/>
+              <ma14:wrappingTextBoxFlag xmlns:ma14="http://schemas.microsoft.com/office/mac/drawingml/2011/main" xmlns:a14="http://schemas.microsoft.com/office/drawing/2010/main" xmlns:m="http://schemas.openxmlformats.org/officeDocument/2006/math" xmlns="" val="1"/>
             </a:ext>
           </a:extLst>
         </p:spPr>
@@ -36232,7 +36228,7 @@
           </a:ln>
           <a:extLst>
             <a:ext uri="{C572A759-6A51-4108-AA02-DFA0A04FC94B}">
-              <ma14:wrappingTextBoxFlag xmlns="" xmlns:m="http://schemas.openxmlformats.org/officeDocument/2006/math" xmlns:a14="http://schemas.microsoft.com/office/drawing/2010/main" xmlns:ma14="http://schemas.microsoft.com/office/mac/drawingml/2011/main" val="1"/>
+              <ma14:wrappingTextBoxFlag xmlns:ma14="http://schemas.microsoft.com/office/mac/drawingml/2011/main" xmlns:a14="http://schemas.microsoft.com/office/drawing/2010/main" xmlns:m="http://schemas.openxmlformats.org/officeDocument/2006/math" xmlns="" val="1"/>
             </a:ext>
           </a:extLst>
         </p:spPr>

</xml_diff>